<commit_message>
Changes to be committed: 	modified:   Pic Matcher.pptx
</commit_message>
<xml_diff>
--- a/Pic Matcher.pptx
+++ b/Pic Matcher.pptx
@@ -109,6 +109,11 @@
       </a:defRPr>
     </a:lvl9pPr>
   </p:defaultTextStyle>
+  <p:extLst>
+    <p:ext uri="{EFAFB233-063F-42B5-8137-9DF3F51BA10A}">
+      <p15:sldGuideLst xmlns:p15="http://schemas.microsoft.com/office/powerpoint/2012/main"/>
+    </p:ext>
+  </p:extLst>
 </p:presentation>
 </file>
 
@@ -4067,6 +4072,35 @@
               <a:t>The server must be capable of running so much of load given by the face-recognition package.</a:t>
             </a:r>
           </a:p>
+          <a:p>
+            <a:endParaRPr lang="en-US" dirty="0"/>
+          </a:p>
+          <a:p>
+            <a:pPr marL="0" indent="0">
+              <a:buNone/>
+            </a:pPr>
+            <a:endParaRPr lang="en-US" dirty="0"/>
+          </a:p>
+          <a:p>
+            <a:pPr marL="0" indent="0">
+              <a:buNone/>
+            </a:pPr>
+            <a:r>
+              <a:rPr lang="en-US" dirty="0" err="1"/>
+              <a:t>Github</a:t>
+            </a:r>
+            <a:r>
+              <a:rPr lang="en-US" dirty="0"/>
+              <a:t> Repo Of My Code: </a:t>
+            </a:r>
+            <a:r>
+              <a:rPr lang="en-US" dirty="0">
+                <a:hlinkClick r:id="rId2"/>
+              </a:rPr>
+              <a:t>https://github.com/Parvat-R/ImageFinder</a:t>
+            </a:r>
+            <a:endParaRPr lang="en-US" dirty="0"/>
+          </a:p>
         </p:txBody>
       </p:sp>
     </p:spTree>

</xml_diff>